<commit_message>
Presentation modified Report updated
</commit_message>
<xml_diff>
--- a/docs/PG-ABM.pptx
+++ b/docs/PG-ABM.pptx
@@ -2442,8 +2442,8 @@
   </dgm:ptLst>
   <dgm:cxnLst>
     <dgm:cxn modelId="{76542F0F-A5C2-486A-95BC-906AC467DBCE}" srcId="{906746C8-F039-41AC-A4D6-77BF590001B8}" destId="{F62C27CA-2BB3-409C-89FA-A81162991D02}" srcOrd="1" destOrd="0" parTransId="{9094D15C-AD4C-4542-9E5A-709AC237AB54}" sibTransId="{6AE7CCDE-8E7F-4145-BA12-C63ACFAC3AA1}"/>
+    <dgm:cxn modelId="{CB20B662-4E8C-4565-8743-1CA02B62FAEA}" type="presOf" srcId="{A8F19ED1-1058-4A1A-BB8B-4480C929236A}" destId="{9485B57D-8C64-4610-A795-49AAA3CDE850}" srcOrd="0" destOrd="0" presId="urn:microsoft.com/office/officeart/2005/8/layout/chevron2"/>
     <dgm:cxn modelId="{717A3155-93B7-415E-B2C5-FC72B96F90AE}" type="presOf" srcId="{906746C8-F039-41AC-A4D6-77BF590001B8}" destId="{B764BEF4-4F80-4795-AE04-603FBA9EF1C9}" srcOrd="0" destOrd="0" presId="urn:microsoft.com/office/officeart/2005/8/layout/chevron2"/>
-    <dgm:cxn modelId="{CB20B662-4E8C-4565-8743-1CA02B62FAEA}" type="presOf" srcId="{A8F19ED1-1058-4A1A-BB8B-4480C929236A}" destId="{9485B57D-8C64-4610-A795-49AAA3CDE850}" srcOrd="0" destOrd="0" presId="urn:microsoft.com/office/officeart/2005/8/layout/chevron2"/>
     <dgm:cxn modelId="{233BDAB5-FDA2-4B17-929C-4D99C5EA461C}" type="presOf" srcId="{F62C27CA-2BB3-409C-89FA-A81162991D02}" destId="{AF8435BD-FC14-4463-A4AC-0D246C47AC11}" srcOrd="0" destOrd="0" presId="urn:microsoft.com/office/officeart/2005/8/layout/chevron2"/>
     <dgm:cxn modelId="{5D8EEA2E-651F-493A-BABC-A7796AA45DAE}" srcId="{A8F19ED1-1058-4A1A-BB8B-4480C929236A}" destId="{99443544-9464-4316-8E24-155C84101C16}" srcOrd="0" destOrd="0" parTransId="{8AB0AFCD-2771-4197-A508-2065F2987CCE}" sibTransId="{5AD6F6D5-0CAC-4019-BA86-15EFF1345B62}"/>
     <dgm:cxn modelId="{8683D19C-7DC0-4C8E-8CDB-FACAED6FD436}" type="presOf" srcId="{99443544-9464-4316-8E24-155C84101C16}" destId="{B0AAF2F8-CAB5-45A5-A954-9D84615E8A36}" srcOrd="0" destOrd="0" presId="urn:microsoft.com/office/officeart/2005/8/layout/chevron2"/>
@@ -6110,7 +6110,7 @@
           <a:p>
             <a:fld id="{F030D2D7-B421-AA4E-866D-C76D407B15C6}" type="datetimeFigureOut">
               <a:rPr lang="en-US" smtClean="0"/>
-              <a:t>12/15/14</a:t>
+              <a:t>12/17/2014</a:t>
             </a:fld>
             <a:endParaRPr lang="en-US"/>
           </a:p>
@@ -6276,7 +6276,7 @@
           <a:p>
             <a:fld id="{6A99D90D-190E-43A5-9570-6DEC79A43DAE}" type="datetimeFigureOut">
               <a:rPr lang="en-US" smtClean="0"/>
-              <a:t>12/15/14</a:t>
+              <a:t>12/17/2014</a:t>
             </a:fld>
             <a:endParaRPr lang="en-US"/>
           </a:p>
@@ -6959,18 +6959,7 @@
                 <a:ea typeface="+mn-ea"/>
                 <a:cs typeface="+mn-cs"/>
               </a:rPr>
-              <a:t>hunter-gatherer society were egalitarian and lacked social institutions for collective governance (proved in 20</a:t>
-            </a:r>
-            <a:r>
-              <a:rPr lang="en-US" sz="1200" b="0" i="0" u="none" strike="noStrike" kern="1200" baseline="30000" dirty="0" smtClean="0">
-                <a:solidFill>
-                  <a:schemeClr val="tx1"/>
-                </a:solidFill>
-                <a:latin typeface="+mn-lt"/>
-                <a:ea typeface="+mn-ea"/>
-                <a:cs typeface="+mn-cs"/>
-              </a:rPr>
-              <a:t>th</a:t>
+              <a:t>warmer </a:t>
             </a:r>
             <a:r>
               <a:rPr lang="en-US" sz="1200" b="0" i="0" u="none" strike="noStrike" kern="1200" baseline="0" dirty="0" smtClean="0">
@@ -6981,20 +6970,7 @@
                 <a:ea typeface="+mn-ea"/>
                 <a:cs typeface="+mn-cs"/>
               </a:rPr>
-              <a:t> century)</a:t>
-            </a:r>
-          </a:p>
-          <a:p>
-            <a:r>
-              <a:rPr lang="en-US" sz="1200" b="0" i="0" u="none" strike="noStrike" kern="1200" baseline="0" dirty="0" smtClean="0">
-                <a:solidFill>
-                  <a:schemeClr val="tx1"/>
-                </a:solidFill>
-                <a:latin typeface="+mn-lt"/>
-                <a:ea typeface="+mn-ea"/>
-                <a:cs typeface="+mn-cs"/>
-              </a:rPr>
-              <a:t>warmer climate with increased food supply, in addition to plant and animal domestication : some groups became wealthier than others</a:t>
+              <a:t>climate with increased food supply, in addition to plant and animal domestication : some groups became wealthier than others</a:t>
             </a:r>
           </a:p>
           <a:p>
@@ -7639,7 +7615,7 @@
           <a:p>
             <a:fld id="{224E8EF4-4EDB-164C-AE2F-3850C3027C79}" type="datetime1">
               <a:rPr lang="en-US" smtClean="0"/>
-              <a:t>12/15/14</a:t>
+              <a:t>12/17/2014</a:t>
             </a:fld>
             <a:endParaRPr lang="en-US"/>
           </a:p>
@@ -7809,7 +7785,7 @@
           <a:p>
             <a:fld id="{06ECB35D-7062-DC4D-830F-E30C43EA2AA0}" type="datetime1">
               <a:rPr lang="en-US" smtClean="0"/>
-              <a:t>12/15/14</a:t>
+              <a:t>12/17/2014</a:t>
             </a:fld>
             <a:endParaRPr lang="en-US"/>
           </a:p>
@@ -7989,7 +7965,7 @@
           <a:p>
             <a:fld id="{3CAFC3F5-8B71-6346-ACBC-468168707CF9}" type="datetime1">
               <a:rPr lang="en-US" smtClean="0"/>
-              <a:t>12/15/14</a:t>
+              <a:t>12/17/2014</a:t>
             </a:fld>
             <a:endParaRPr lang="en-US"/>
           </a:p>
@@ -8159,7 +8135,7 @@
           <a:p>
             <a:fld id="{3874DE17-CB15-F445-8F8B-FC8F9982CB2E}" type="datetime1">
               <a:rPr lang="en-US" smtClean="0"/>
-              <a:t>12/15/14</a:t>
+              <a:t>12/17/2014</a:t>
             </a:fld>
             <a:endParaRPr lang="en-US"/>
           </a:p>
@@ -8405,7 +8381,7 @@
           <a:p>
             <a:fld id="{9F373961-3D5C-064E-94E7-E02FFE90993E}" type="datetime1">
               <a:rPr lang="en-US" smtClean="0"/>
-              <a:t>12/15/14</a:t>
+              <a:t>12/17/2014</a:t>
             </a:fld>
             <a:endParaRPr lang="en-US"/>
           </a:p>
@@ -8693,7 +8669,7 @@
           <a:p>
             <a:fld id="{85E23AA2-0903-F04C-85B2-F02E9AC251DC}" type="datetime1">
               <a:rPr lang="en-US" smtClean="0"/>
-              <a:t>12/15/14</a:t>
+              <a:t>12/17/2014</a:t>
             </a:fld>
             <a:endParaRPr lang="en-US"/>
           </a:p>
@@ -9115,7 +9091,7 @@
           <a:p>
             <a:fld id="{465E57F8-4B6A-F649-8431-676B9E68724F}" type="datetime1">
               <a:rPr lang="en-US" smtClean="0"/>
-              <a:t>12/15/14</a:t>
+              <a:t>12/17/2014</a:t>
             </a:fld>
             <a:endParaRPr lang="en-US"/>
           </a:p>
@@ -9233,7 +9209,7 @@
           <a:p>
             <a:fld id="{1F8EA50C-CA2A-784F-917B-935487864792}" type="datetime1">
               <a:rPr lang="en-US" smtClean="0"/>
-              <a:t>12/15/14</a:t>
+              <a:t>12/17/2014</a:t>
             </a:fld>
             <a:endParaRPr lang="en-US"/>
           </a:p>
@@ -9328,7 +9304,7 @@
           <a:p>
             <a:fld id="{E06F491E-F021-DF49-8688-6035050D24F3}" type="datetime1">
               <a:rPr lang="en-US" smtClean="0"/>
-              <a:t>12/15/14</a:t>
+              <a:t>12/17/2014</a:t>
             </a:fld>
             <a:endParaRPr lang="en-US"/>
           </a:p>
@@ -9605,7 +9581,7 @@
           <a:p>
             <a:fld id="{92322C86-ECE0-7548-9146-877332D919CB}" type="datetime1">
               <a:rPr lang="en-US" smtClean="0"/>
-              <a:t>12/15/14</a:t>
+              <a:t>12/17/2014</a:t>
             </a:fld>
             <a:endParaRPr lang="en-US"/>
           </a:p>
@@ -9858,7 +9834,7 @@
           <a:p>
             <a:fld id="{4DB2A9BB-AB77-944D-A61F-3CC441FF8DD7}" type="datetime1">
               <a:rPr lang="en-US" smtClean="0"/>
-              <a:t>12/15/14</a:t>
+              <a:t>12/17/2014</a:t>
             </a:fld>
             <a:endParaRPr lang="en-US"/>
           </a:p>
@@ -10071,7 +10047,7 @@
           <a:p>
             <a:fld id="{2327D0E2-0164-7645-8D5C-D87BCF2DD8A2}" type="datetime1">
               <a:rPr lang="en-US" smtClean="0"/>
-              <a:t>12/15/14</a:t>
+              <a:t>12/17/2014</a:t>
             </a:fld>
             <a:endParaRPr lang="en-US"/>
           </a:p>
@@ -10528,7 +10504,7 @@
           <a:p>
             <a:fld id="{95E1AB49-8C87-F542-BA6B-484F0AE831FE}" type="datetime1">
               <a:rPr lang="en-US" smtClean="0"/>
-              <a:t>12/15/14</a:t>
+              <a:t>12/17/2014</a:t>
             </a:fld>
             <a:endParaRPr lang="en-US"/>
           </a:p>
@@ -10578,7 +10554,7 @@
   <p:timing>
     <p:tnLst>
       <p:par>
-        <p:cTn xmlns:p14="http://schemas.microsoft.com/office/powerpoint/2010/main" id="1" dur="indefinite" restart="never" nodeType="tmRoot"/>
+        <p:cTn id="1" dur="indefinite" restart="never" nodeType="tmRoot"/>
       </p:par>
     </p:tnLst>
   </p:timing>
@@ -11014,7 +10990,7 @@
           <a:p>
             <a:fld id="{B19A2E83-D452-5A46-AEED-53F1E31FDEE1}" type="datetime1">
               <a:rPr lang="en-US" smtClean="0"/>
-              <a:t>12/15/14</a:t>
+              <a:t>12/17/2014</a:t>
             </a:fld>
             <a:endParaRPr lang="en-US"/>
           </a:p>
@@ -11056,7 +11032,7 @@
   <p:timing>
     <p:tnLst>
       <p:par>
-        <p:cTn xmlns:p14="http://schemas.microsoft.com/office/powerpoint/2010/main" id="1" dur="indefinite" restart="never" nodeType="tmRoot"/>
+        <p:cTn id="1" dur="indefinite" restart="never" nodeType="tmRoot"/>
       </p:par>
     </p:tnLst>
   </p:timing>
@@ -11134,7 +11110,7 @@
           </a:prstGeom>
           <a:noFill/>
           <a:extLst>
-            <a:ext uri="{909E8E84-426E-40dd-AFC4-6F175D3DCCD1}">
+            <a:ext uri="{909E8E84-426E-40DD-AFC4-6F175D3DCCD1}">
               <a14:hiddenFill xmlns:a14="http://schemas.microsoft.com/office/drawing/2010/main">
                 <a:solidFill>
                   <a:srgbClr val="FFFFFF"/>
@@ -11175,7 +11151,7 @@
           </a:prstGeom>
           <a:noFill/>
           <a:extLst>
-            <a:ext uri="{909E8E84-426E-40dd-AFC4-6F175D3DCCD1}">
+            <a:ext uri="{909E8E84-426E-40DD-AFC4-6F175D3DCCD1}">
               <a14:hiddenFill xmlns:a14="http://schemas.microsoft.com/office/drawing/2010/main">
                 <a:solidFill>
                   <a:srgbClr val="FFFFFF"/>
@@ -11253,7 +11229,7 @@
           <a:p>
             <a:fld id="{6AA6ECCF-E443-8846-AF65-159EF0AAFE95}" type="datetime1">
               <a:rPr lang="en-US" smtClean="0"/>
-              <a:t>12/15/14</a:t>
+              <a:t>12/17/2014</a:t>
             </a:fld>
             <a:endParaRPr lang="en-US"/>
           </a:p>
@@ -11295,7 +11271,7 @@
   <p:timing>
     <p:tnLst>
       <p:par>
-        <p:cTn xmlns:p14="http://schemas.microsoft.com/office/powerpoint/2010/main" id="1" dur="indefinite" restart="never" nodeType="tmRoot"/>
+        <p:cTn id="1" dur="indefinite" restart="never" nodeType="tmRoot"/>
       </p:par>
     </p:tnLst>
   </p:timing>
@@ -11359,7 +11335,7 @@
           <a:p>
             <a:fld id="{3874DE17-CB15-F445-8F8B-FC8F9982CB2E}" type="datetime1">
               <a:rPr lang="en-US" smtClean="0"/>
-              <a:t>12/15/14</a:t>
+              <a:t>12/17/2014</a:t>
             </a:fld>
             <a:endParaRPr lang="en-US"/>
           </a:p>
@@ -11639,7 +11615,7 @@
   <p:timing>
     <p:tnLst>
       <p:par>
-        <p:cTn xmlns:p14="http://schemas.microsoft.com/office/powerpoint/2010/main" id="1" dur="indefinite" restart="never" nodeType="tmRoot"/>
+        <p:cTn id="1" dur="indefinite" restart="never" nodeType="tmRoot"/>
       </p:par>
     </p:tnLst>
   </p:timing>
@@ -12600,7 +12576,7 @@
           <a:p>
             <a:fld id="{911A473C-DBFF-1544-AC1B-E6A226C47CA6}" type="datetime1">
               <a:rPr lang="en-US" smtClean="0"/>
-              <a:t>12/15/14</a:t>
+              <a:t>12/17/2014</a:t>
             </a:fld>
             <a:endParaRPr lang="en-US"/>
           </a:p>
@@ -12642,7 +12618,7 @@
   <p:timing>
     <p:tnLst>
       <p:par>
-        <p:cTn xmlns:p14="http://schemas.microsoft.com/office/powerpoint/2010/main" id="1" dur="indefinite" restart="never" nodeType="tmRoot"/>
+        <p:cTn id="1" dur="indefinite" restart="never" nodeType="tmRoot"/>
       </p:par>
     </p:tnLst>
   </p:timing>
@@ -12720,7 +12696,7 @@
           </a:prstGeom>
           <a:noFill/>
           <a:extLst>
-            <a:ext uri="{909E8E84-426E-40dd-AFC4-6F175D3DCCD1}">
+            <a:ext uri="{909E8E84-426E-40DD-AFC4-6F175D3DCCD1}">
               <a14:hiddenFill xmlns:a14="http://schemas.microsoft.com/office/drawing/2010/main">
                 <a:solidFill>
                   <a:srgbClr val="FFFFFF"/>
@@ -12747,7 +12723,7 @@
           <a:p>
             <a:fld id="{22752E75-7039-8146-9380-9CA836F87067}" type="datetime1">
               <a:rPr lang="en-US" smtClean="0"/>
-              <a:t>12/15/14</a:t>
+              <a:t>12/17/2014</a:t>
             </a:fld>
             <a:endParaRPr lang="en-US"/>
           </a:p>
@@ -12789,7 +12765,7 @@
   <p:timing>
     <p:tnLst>
       <p:par>
-        <p:cTn xmlns:p14="http://schemas.microsoft.com/office/powerpoint/2010/main" id="1" dur="indefinite" restart="never" nodeType="tmRoot"/>
+        <p:cTn id="1" dur="indefinite" restart="never" nodeType="tmRoot"/>
       </p:par>
     </p:tnLst>
   </p:timing>
@@ -12863,15 +12839,7 @@
             </a:r>
             <a:r>
               <a:rPr lang="en-US" smtClean="0"/>
-              <a:t>sweep </a:t>
-            </a:r>
-            <a:r>
-              <a:rPr lang="en-US" smtClean="0"/>
-              <a:t>-&gt; </a:t>
-            </a:r>
-            <a:r>
-              <a:rPr lang="en-US" smtClean="0"/>
-              <a:t>Statistics</a:t>
+              <a:t>sweep -&gt; Statistics</a:t>
             </a:r>
             <a:endParaRPr lang="en-US" dirty="0"/>
           </a:p>
@@ -12894,7 +12862,7 @@
           <a:p>
             <a:fld id="{C21AA035-1248-E34F-A472-FF9E37CA9D8E}" type="datetime1">
               <a:rPr lang="en-US" smtClean="0"/>
-              <a:t>12/15/14</a:t>
+              <a:t>12/17/2014</a:t>
             </a:fld>
             <a:endParaRPr lang="en-US"/>
           </a:p>
@@ -12936,7 +12904,7 @@
   <p:timing>
     <p:tnLst>
       <p:par>
-        <p:cTn xmlns:p14="http://schemas.microsoft.com/office/powerpoint/2010/main" id="1" dur="indefinite" restart="never" nodeType="tmRoot"/>
+        <p:cTn id="1" dur="indefinite" restart="never" nodeType="tmRoot"/>
       </p:par>
     </p:tnLst>
   </p:timing>
@@ -12993,10 +12961,15 @@
             <p:ph idx="1"/>
           </p:nvPr>
         </p:nvSpPr>
-        <p:spPr/>
+        <p:spPr>
+          <a:xfrm>
+            <a:off x="457200" y="1600200"/>
+            <a:ext cx="8229600" cy="4800600"/>
+          </a:xfrm>
+        </p:spPr>
         <p:txBody>
           <a:bodyPr>
-            <a:normAutofit fontScale="92500" lnSpcReduction="20000"/>
+            <a:normAutofit fontScale="85000" lnSpcReduction="20000"/>
           </a:bodyPr>
           <a:lstStyle/>
           <a:p>
@@ -13123,6 +13096,21 @@
               <a:rPr lang="en-US" dirty="0" smtClean="0"/>
               <a:t>PG-ABM</a:t>
             </a:r>
+          </a:p>
+          <a:p>
+            <a:pPr lvl="1"/>
+            <a:r>
+              <a:rPr lang="en-US" dirty="0" smtClean="0"/>
+              <a:t>Environment</a:t>
+            </a:r>
+          </a:p>
+          <a:p>
+            <a:pPr lvl="1"/>
+            <a:r>
+              <a:rPr lang="en-US" dirty="0" smtClean="0"/>
+              <a:t>Agents</a:t>
+            </a:r>
+            <a:endParaRPr lang="en-US" dirty="0" smtClean="0"/>
           </a:p>
           <a:p>
             <a:r>
@@ -13150,7 +13138,7 @@
           <a:p>
             <a:fld id="{53C4D6CE-DB6E-E049-84C8-3DAC606B1506}" type="datetime1">
               <a:rPr lang="en-US" smtClean="0"/>
-              <a:t>12/15/14</a:t>
+              <a:t>12/17/2014</a:t>
             </a:fld>
             <a:endParaRPr lang="en-US"/>
           </a:p>
@@ -13192,7 +13180,7 @@
   <p:timing>
     <p:tnLst>
       <p:par>
-        <p:cTn xmlns:p14="http://schemas.microsoft.com/office/powerpoint/2010/main" id="1" dur="indefinite" restart="never" nodeType="tmRoot"/>
+        <p:cTn id="1" dur="indefinite" restart="never" nodeType="tmRoot"/>
       </p:par>
     </p:tnLst>
   </p:timing>
@@ -13361,7 +13349,7 @@
           <a:p>
             <a:fld id="{0652062D-9200-A645-AAD8-33E68D965621}" type="datetime1">
               <a:rPr lang="en-US" smtClean="0"/>
-              <a:t>12/15/14</a:t>
+              <a:t>12/17/2014</a:t>
             </a:fld>
             <a:endParaRPr lang="en-US"/>
           </a:p>
@@ -13403,7 +13391,7 @@
   <p:timing>
     <p:tnLst>
       <p:par>
-        <p:cTn xmlns:p14="http://schemas.microsoft.com/office/powerpoint/2010/main" id="1" dur="indefinite" restart="never" nodeType="tmRoot"/>
+        <p:cTn id="1" dur="indefinite" restart="never" nodeType="tmRoot"/>
       </p:par>
     </p:tnLst>
   </p:timing>
@@ -13526,7 +13514,7 @@
           <a:p>
             <a:fld id="{7446972F-1FE9-D746-82F0-7923E8A4E300}" type="datetime1">
               <a:rPr lang="en-US" smtClean="0"/>
-              <a:t>12/15/14</a:t>
+              <a:t>12/17/2014</a:t>
             </a:fld>
             <a:endParaRPr lang="en-US"/>
           </a:p>
@@ -13568,7 +13556,7 @@
   <p:timing>
     <p:tnLst>
       <p:par>
-        <p:cTn xmlns:p14="http://schemas.microsoft.com/office/powerpoint/2010/main" id="1" dur="indefinite" restart="never" nodeType="tmRoot"/>
+        <p:cTn id="1" dur="indefinite" restart="never" nodeType="tmRoot"/>
       </p:par>
     </p:tnLst>
   </p:timing>
@@ -13771,7 +13759,7 @@
           <a:p>
             <a:fld id="{77C6436C-8FEB-EB4B-A117-C7E9C181A92B}" type="datetime1">
               <a:rPr lang="en-US" smtClean="0"/>
-              <a:t>12/15/14</a:t>
+              <a:t>12/17/2014</a:t>
             </a:fld>
             <a:endParaRPr lang="en-US"/>
           </a:p>
@@ -13813,7 +13801,7 @@
   <p:timing>
     <p:tnLst>
       <p:par>
-        <p:cTn xmlns:p14="http://schemas.microsoft.com/office/powerpoint/2010/main" id="1" dur="indefinite" restart="never" nodeType="tmRoot"/>
+        <p:cTn id="1" dur="indefinite" restart="never" nodeType="tmRoot"/>
       </p:par>
     </p:tnLst>
   </p:timing>
@@ -13962,7 +13950,7 @@
           <a:p>
             <a:fld id="{0C32FF94-23A9-B742-9442-0F754B36B574}" type="datetime1">
               <a:rPr lang="en-US" smtClean="0"/>
-              <a:t>12/15/14</a:t>
+              <a:t>12/17/2014</a:t>
             </a:fld>
             <a:endParaRPr lang="en-US"/>
           </a:p>
@@ -14004,7 +13992,7 @@
   <p:timing>
     <p:tnLst>
       <p:par>
-        <p:cTn xmlns:p14="http://schemas.microsoft.com/office/powerpoint/2010/main" id="1" dur="indefinite" restart="never" nodeType="tmRoot"/>
+        <p:cTn id="1" dur="indefinite" restart="never" nodeType="tmRoot"/>
       </p:par>
     </p:tnLst>
   </p:timing>
@@ -14767,7 +14755,7 @@
           <a:p>
             <a:fld id="{2A1B7D40-AAD4-FE48-B91A-211A81C672F5}" type="datetime1">
               <a:rPr lang="en-US" smtClean="0"/>
-              <a:t>12/15/14</a:t>
+              <a:t>12/17/2014</a:t>
             </a:fld>
             <a:endParaRPr lang="en-US"/>
           </a:p>
@@ -14809,7 +14797,7 @@
   <p:timing>
     <p:tnLst>
       <p:par>
-        <p:cTn xmlns:p14="http://schemas.microsoft.com/office/powerpoint/2010/main" id="1" dur="indefinite" restart="never" nodeType="tmRoot"/>
+        <p:cTn id="1" dur="indefinite" restart="never" nodeType="tmRoot"/>
       </p:par>
     </p:tnLst>
   </p:timing>
@@ -14911,14 +14899,14 @@
             <a:noFill/>
           </a:ln>
           <a:extLst>
-            <a:ext uri="{909E8E84-426E-40dd-AFC4-6F175D3DCCD1}">
+            <a:ext uri="{909E8E84-426E-40DD-AFC4-6F175D3DCCD1}">
               <a14:hiddenFill xmlns:a14="http://schemas.microsoft.com/office/drawing/2010/main">
                 <a:solidFill>
                   <a:schemeClr val="accent1"/>
                 </a:solidFill>
               </a14:hiddenFill>
             </a:ext>
-            <a:ext uri="{91240B29-F687-4f45-9708-019B960494DF}">
+            <a:ext uri="{91240B29-F687-4F45-9708-019B960494DF}">
               <a14:hiddenLine xmlns:a14="http://schemas.microsoft.com/office/drawing/2010/main" w="9525">
                 <a:solidFill>
                   <a:schemeClr val="tx1"/>
@@ -14962,7 +14950,7 @@
           </a:prstGeom>
           <a:noFill/>
           <a:extLst>
-            <a:ext uri="{909E8E84-426E-40dd-AFC4-6F175D3DCCD1}">
+            <a:ext uri="{909E8E84-426E-40DD-AFC4-6F175D3DCCD1}">
               <a14:hiddenFill xmlns:a14="http://schemas.microsoft.com/office/drawing/2010/main">
                 <a:solidFill>
                   <a:srgbClr val="FFFFFF"/>
@@ -14989,7 +14977,7 @@
           <a:p>
             <a:fld id="{9A837EE2-3232-4345-BBC4-E66625A37634}" type="datetime1">
               <a:rPr lang="en-US" smtClean="0"/>
-              <a:t>12/15/14</a:t>
+              <a:t>12/17/2014</a:t>
             </a:fld>
             <a:endParaRPr lang="en-US"/>
           </a:p>
@@ -15031,7 +15019,7 @@
   <p:timing>
     <p:tnLst>
       <p:par>
-        <p:cTn xmlns:p14="http://schemas.microsoft.com/office/powerpoint/2010/main" id="1" dur="indefinite" restart="never" nodeType="tmRoot"/>
+        <p:cTn id="1" dur="indefinite" restart="never" nodeType="tmRoot"/>
       </p:par>
     </p:tnLst>
   </p:timing>
@@ -15203,14 +15191,14 @@
             <a:noFill/>
           </a:ln>
           <a:extLst>
-            <a:ext uri="{909E8E84-426E-40dd-AFC4-6F175D3DCCD1}">
+            <a:ext uri="{909E8E84-426E-40DD-AFC4-6F175D3DCCD1}">
               <a14:hiddenFill xmlns:a14="http://schemas.microsoft.com/office/drawing/2010/main">
                 <a:solidFill>
                   <a:schemeClr val="accent1"/>
                 </a:solidFill>
               </a14:hiddenFill>
             </a:ext>
-            <a:ext uri="{91240B29-F687-4f45-9708-019B960494DF}">
+            <a:ext uri="{91240B29-F687-4F45-9708-019B960494DF}">
               <a14:hiddenLine xmlns:a14="http://schemas.microsoft.com/office/drawing/2010/main" w="9525">
                 <a:solidFill>
                   <a:schemeClr val="tx1"/>
@@ -15254,7 +15242,7 @@
           </a:prstGeom>
           <a:noFill/>
           <a:extLst>
-            <a:ext uri="{909E8E84-426E-40dd-AFC4-6F175D3DCCD1}">
+            <a:ext uri="{909E8E84-426E-40DD-AFC4-6F175D3DCCD1}">
               <a14:hiddenFill xmlns:a14="http://schemas.microsoft.com/office/drawing/2010/main">
                 <a:solidFill>
                   <a:srgbClr val="FFFFFF"/>
@@ -15295,7 +15283,7 @@
           </a:prstGeom>
           <a:noFill/>
           <a:extLst>
-            <a:ext uri="{909E8E84-426E-40dd-AFC4-6F175D3DCCD1}">
+            <a:ext uri="{909E8E84-426E-40DD-AFC4-6F175D3DCCD1}">
               <a14:hiddenFill xmlns:a14="http://schemas.microsoft.com/office/drawing/2010/main">
                 <a:solidFill>
                   <a:srgbClr val="FFFFFF"/>
@@ -15339,14 +15327,14 @@
             <a:noFill/>
           </a:ln>
           <a:extLst>
-            <a:ext uri="{909E8E84-426E-40dd-AFC4-6F175D3DCCD1}">
+            <a:ext uri="{909E8E84-426E-40DD-AFC4-6F175D3DCCD1}">
               <a14:hiddenFill xmlns:a14="http://schemas.microsoft.com/office/drawing/2010/main">
                 <a:solidFill>
                   <a:schemeClr val="accent1"/>
                 </a:solidFill>
               </a14:hiddenFill>
             </a:ext>
-            <a:ext uri="{91240B29-F687-4f45-9708-019B960494DF}">
+            <a:ext uri="{91240B29-F687-4F45-9708-019B960494DF}">
               <a14:hiddenLine xmlns:a14="http://schemas.microsoft.com/office/drawing/2010/main" w="9525">
                 <a:solidFill>
                   <a:schemeClr val="tx1"/>
@@ -15393,14 +15381,14 @@
             <a:noFill/>
           </a:ln>
           <a:extLst>
-            <a:ext uri="{909E8E84-426E-40dd-AFC4-6F175D3DCCD1}">
+            <a:ext uri="{909E8E84-426E-40DD-AFC4-6F175D3DCCD1}">
               <a14:hiddenFill xmlns:a14="http://schemas.microsoft.com/office/drawing/2010/main">
                 <a:solidFill>
                   <a:schemeClr val="accent1"/>
                 </a:solidFill>
               </a14:hiddenFill>
             </a:ext>
-            <a:ext uri="{91240B29-F687-4f45-9708-019B960494DF}">
+            <a:ext uri="{91240B29-F687-4F45-9708-019B960494DF}">
               <a14:hiddenLine xmlns:a14="http://schemas.microsoft.com/office/drawing/2010/main" w="9525">
                 <a:solidFill>
                   <a:schemeClr val="tx1"/>
@@ -15447,14 +15435,14 @@
             <a:noFill/>
           </a:ln>
           <a:extLst>
-            <a:ext uri="{909E8E84-426E-40dd-AFC4-6F175D3DCCD1}">
+            <a:ext uri="{909E8E84-426E-40DD-AFC4-6F175D3DCCD1}">
               <a14:hiddenFill xmlns:a14="http://schemas.microsoft.com/office/drawing/2010/main">
                 <a:solidFill>
                   <a:schemeClr val="accent1"/>
                 </a:solidFill>
               </a14:hiddenFill>
             </a:ext>
-            <a:ext uri="{91240B29-F687-4f45-9708-019B960494DF}">
+            <a:ext uri="{91240B29-F687-4F45-9708-019B960494DF}">
               <a14:hiddenLine xmlns:a14="http://schemas.microsoft.com/office/drawing/2010/main" w="9525">
                 <a:solidFill>
                   <a:schemeClr val="tx1"/>
@@ -15501,14 +15489,14 @@
             <a:noFill/>
           </a:ln>
           <a:extLst>
-            <a:ext uri="{909E8E84-426E-40dd-AFC4-6F175D3DCCD1}">
+            <a:ext uri="{909E8E84-426E-40DD-AFC4-6F175D3DCCD1}">
               <a14:hiddenFill xmlns:a14="http://schemas.microsoft.com/office/drawing/2010/main">
                 <a:solidFill>
                   <a:schemeClr val="accent1"/>
                 </a:solidFill>
               </a14:hiddenFill>
             </a:ext>
-            <a:ext uri="{91240B29-F687-4f45-9708-019B960494DF}">
+            <a:ext uri="{91240B29-F687-4F45-9708-019B960494DF}">
               <a14:hiddenLine xmlns:a14="http://schemas.microsoft.com/office/drawing/2010/main" w="9525">
                 <a:solidFill>
                   <a:schemeClr val="tx1"/>
@@ -15538,7 +15526,7 @@
           <a:p>
             <a:fld id="{A44B904C-0534-914F-82BA-A14AEE7A1C0D}" type="datetime1">
               <a:rPr lang="en-US" smtClean="0"/>
-              <a:t>12/15/14</a:t>
+              <a:t>12/17/2014</a:t>
             </a:fld>
             <a:endParaRPr lang="en-US"/>
           </a:p>
@@ -15580,7 +15568,7 @@
   <p:timing>
     <p:tnLst>
       <p:par>
-        <p:cTn xmlns:p14="http://schemas.microsoft.com/office/powerpoint/2010/main" id="1" dur="indefinite" restart="never" nodeType="tmRoot"/>
+        <p:cTn id="1" dur="indefinite" restart="never" nodeType="tmRoot"/>
       </p:par>
     </p:tnLst>
   </p:timing>

</xml_diff>